<commit_message>
Updated 'blue-tech-icons.pptx' so that the PowerPoint shapes are no longer dependent upon specific Office theme colors
</commit_message>
<xml_diff>
--- a/blue-tech-icons.pptx
+++ b/blue-tech-icons.pptx
@@ -1,6 +1,6 @@
 
 <file path=ppt/presentation.xml><?xml version="1.0" encoding="utf-8"?>
-<p:presentation xmlns:a="http://schemas.openxmlformats.org/drawingml/2006/main" xmlns:r="http://schemas.openxmlformats.org/officeDocument/2006/relationships" xmlns:mc="http://schemas.openxmlformats.org/markup-compatibility/2006" xmlns:mv="urn:schemas-microsoft-com:mac:vml" xmlns:p="http://schemas.openxmlformats.org/presentationml/2006/main" mc:Ignorable="mv" mc:PreserveAttributes="mv:*" saveSubsetFonts="1" autoCompressPictures="0">
+<p:presentation xmlns:a="http://schemas.openxmlformats.org/drawingml/2006/main" xmlns:r="http://schemas.openxmlformats.org/officeDocument/2006/relationships" xmlns:p="http://schemas.openxmlformats.org/presentationml/2006/main" saveSubsetFonts="1" autoCompressPictures="0">
   <p:sldMasterIdLst>
     <p:sldMasterId id="2147483648" r:id="rId1"/>
   </p:sldMasterIdLst>
@@ -111,7 +111,7 @@
 </file>
 
 <file path=ppt/notesMasters/notesMaster1.xml><?xml version="1.0" encoding="utf-8"?>
-<p:notesMaster xmlns:a="http://schemas.openxmlformats.org/drawingml/2006/main" xmlns:r="http://schemas.openxmlformats.org/officeDocument/2006/relationships" xmlns:mc="http://schemas.openxmlformats.org/markup-compatibility/2006" xmlns:mv="urn:schemas-microsoft-com:mac:vml" xmlns:p="http://schemas.openxmlformats.org/presentationml/2006/main" mc:Ignorable="mv" mc:PreserveAttributes="mv:*">
+<p:notesMaster xmlns:a="http://schemas.openxmlformats.org/drawingml/2006/main" xmlns:r="http://schemas.openxmlformats.org/officeDocument/2006/relationships" xmlns:p="http://schemas.openxmlformats.org/presentationml/2006/main">
   <p:cSld>
     <p:bg>
       <p:bgRef idx="1001">
@@ -193,7 +193,7 @@
             <a:fld id="{A54233AD-9FEC-4642-8D28-AC08EC532D80}" type="datetimeFigureOut">
               <a:rPr lang="en-US" smtClean="0"/>
               <a:pPr/>
-              <a:t>3/16/15</a:t>
+              <a:t>2/2/16</a:t>
             </a:fld>
             <a:endParaRPr lang="en-US"/>
           </a:p>
@@ -362,6 +362,11 @@
         </p:txBody>
       </p:sp>
     </p:spTree>
+    <p:extLst>
+      <p:ext uri="{BB962C8B-B14F-4D97-AF65-F5344CB8AC3E}">
+        <p14:creationId xmlns:p14="http://schemas.microsoft.com/office/powerpoint/2010/main" val="2817701372"/>
+      </p:ext>
+    </p:extLst>
   </p:cSld>
   <p:clrMap bg1="lt1" tx1="dk1" bg2="lt2" tx2="dk2" accent1="accent1" accent2="accent2" accent3="accent3" accent4="accent4" accent5="accent5" accent6="accent6" hlink="hlink" folHlink="folHlink"/>
   <p:notesStyle>
@@ -460,7 +465,7 @@
 </file>
 
 <file path=ppt/notesSlides/notesSlide1.xml><?xml version="1.0" encoding="utf-8"?>
-<p:notes xmlns:a="http://schemas.openxmlformats.org/drawingml/2006/main" xmlns:r="http://schemas.openxmlformats.org/officeDocument/2006/relationships" xmlns:mc="http://schemas.openxmlformats.org/markup-compatibility/2006" xmlns:mv="urn:schemas-microsoft-com:mac:vml" xmlns:p="http://schemas.openxmlformats.org/presentationml/2006/main" mc:Ignorable="mv" mc:PreserveAttributes="mv:*">
+<p:notes xmlns:a="http://schemas.openxmlformats.org/drawingml/2006/main" xmlns:r="http://schemas.openxmlformats.org/officeDocument/2006/relationships" xmlns:p="http://schemas.openxmlformats.org/presentationml/2006/main">
   <p:cSld>
     <p:spTree>
       <p:nvGrpSpPr>
@@ -542,7 +547,7 @@
 </file>
 
 <file path=ppt/slideLayouts/slideLayout1.xml><?xml version="1.0" encoding="utf-8"?>
-<p:sldLayout xmlns:a="http://schemas.openxmlformats.org/drawingml/2006/main" xmlns:r="http://schemas.openxmlformats.org/officeDocument/2006/relationships" xmlns:mc="http://schemas.openxmlformats.org/markup-compatibility/2006" xmlns:mv="urn:schemas-microsoft-com:mac:vml" xmlns:p="http://schemas.openxmlformats.org/presentationml/2006/main" mc:Ignorable="mv" mc:PreserveAttributes="mv:*" type="title" preserve="1">
+<p:sldLayout xmlns:a="http://schemas.openxmlformats.org/drawingml/2006/main" xmlns:r="http://schemas.openxmlformats.org/officeDocument/2006/relationships" xmlns:p="http://schemas.openxmlformats.org/presentationml/2006/main" type="title" preserve="1">
   <p:cSld name="Title Slide">
     <p:spTree>
       <p:nvGrpSpPr>
@@ -723,7 +728,7 @@
             <a:fld id="{ED21B5B1-1DD9-8F46-9A43-DBE14D7AA15C}" type="datetimeFigureOut">
               <a:rPr lang="en-US" smtClean="0"/>
               <a:pPr/>
-              <a:t>3/16/15</a:t>
+              <a:t>2/2/16</a:t>
             </a:fld>
             <a:endParaRPr lang="en-US"/>
           </a:p>
@@ -781,7 +786,7 @@
 </file>
 
 <file path=ppt/slideLayouts/slideLayout10.xml><?xml version="1.0" encoding="utf-8"?>
-<p:sldLayout xmlns:a="http://schemas.openxmlformats.org/drawingml/2006/main" xmlns:r="http://schemas.openxmlformats.org/officeDocument/2006/relationships" xmlns:mc="http://schemas.openxmlformats.org/markup-compatibility/2006" xmlns:mv="urn:schemas-microsoft-com:mac:vml" xmlns:p="http://schemas.openxmlformats.org/presentationml/2006/main" mc:Ignorable="mv" mc:PreserveAttributes="mv:*" type="vertTx" preserve="1">
+<p:sldLayout xmlns:a="http://schemas.openxmlformats.org/drawingml/2006/main" xmlns:r="http://schemas.openxmlformats.org/officeDocument/2006/relationships" xmlns:p="http://schemas.openxmlformats.org/presentationml/2006/main" type="vertTx" preserve="1">
   <p:cSld name="Title and Vertical Text">
     <p:spTree>
       <p:nvGrpSpPr>
@@ -890,7 +895,7 @@
             <a:fld id="{ED21B5B1-1DD9-8F46-9A43-DBE14D7AA15C}" type="datetimeFigureOut">
               <a:rPr lang="en-US" smtClean="0"/>
               <a:pPr/>
-              <a:t>3/16/15</a:t>
+              <a:t>2/2/16</a:t>
             </a:fld>
             <a:endParaRPr lang="en-US"/>
           </a:p>
@@ -948,7 +953,7 @@
 </file>
 
 <file path=ppt/slideLayouts/slideLayout11.xml><?xml version="1.0" encoding="utf-8"?>
-<p:sldLayout xmlns:a="http://schemas.openxmlformats.org/drawingml/2006/main" xmlns:r="http://schemas.openxmlformats.org/officeDocument/2006/relationships" xmlns:mc="http://schemas.openxmlformats.org/markup-compatibility/2006" xmlns:mv="urn:schemas-microsoft-com:mac:vml" xmlns:p="http://schemas.openxmlformats.org/presentationml/2006/main" mc:Ignorable="mv" mc:PreserveAttributes="mv:*" type="vertTitleAndTx" preserve="1">
+<p:sldLayout xmlns:a="http://schemas.openxmlformats.org/drawingml/2006/main" xmlns:r="http://schemas.openxmlformats.org/officeDocument/2006/relationships" xmlns:p="http://schemas.openxmlformats.org/presentationml/2006/main" type="vertTitleAndTx" preserve="1">
   <p:cSld name="Vertical Title and Text">
     <p:spTree>
       <p:nvGrpSpPr>
@@ -1067,7 +1072,7 @@
             <a:fld id="{ED21B5B1-1DD9-8F46-9A43-DBE14D7AA15C}" type="datetimeFigureOut">
               <a:rPr lang="en-US" smtClean="0"/>
               <a:pPr/>
-              <a:t>3/16/15</a:t>
+              <a:t>2/2/16</a:t>
             </a:fld>
             <a:endParaRPr lang="en-US"/>
           </a:p>
@@ -1125,7 +1130,7 @@
 </file>
 
 <file path=ppt/slideLayouts/slideLayout2.xml><?xml version="1.0" encoding="utf-8"?>
-<p:sldLayout xmlns:a="http://schemas.openxmlformats.org/drawingml/2006/main" xmlns:r="http://schemas.openxmlformats.org/officeDocument/2006/relationships" xmlns:mc="http://schemas.openxmlformats.org/markup-compatibility/2006" xmlns:mv="urn:schemas-microsoft-com:mac:vml" xmlns:p="http://schemas.openxmlformats.org/presentationml/2006/main" mc:Ignorable="mv" mc:PreserveAttributes="mv:*" type="obj" preserve="1">
+<p:sldLayout xmlns:a="http://schemas.openxmlformats.org/drawingml/2006/main" xmlns:r="http://schemas.openxmlformats.org/officeDocument/2006/relationships" xmlns:p="http://schemas.openxmlformats.org/presentationml/2006/main" type="obj" preserve="1">
   <p:cSld name="Title and Content">
     <p:spTree>
       <p:nvGrpSpPr>
@@ -1234,7 +1239,7 @@
             <a:fld id="{ED21B5B1-1DD9-8F46-9A43-DBE14D7AA15C}" type="datetimeFigureOut">
               <a:rPr lang="en-US" smtClean="0"/>
               <a:pPr/>
-              <a:t>3/16/15</a:t>
+              <a:t>2/2/16</a:t>
             </a:fld>
             <a:endParaRPr lang="en-US"/>
           </a:p>
@@ -1292,7 +1297,7 @@
 </file>
 
 <file path=ppt/slideLayouts/slideLayout3.xml><?xml version="1.0" encoding="utf-8"?>
-<p:sldLayout xmlns:a="http://schemas.openxmlformats.org/drawingml/2006/main" xmlns:r="http://schemas.openxmlformats.org/officeDocument/2006/relationships" xmlns:mc="http://schemas.openxmlformats.org/markup-compatibility/2006" xmlns:mv="urn:schemas-microsoft-com:mac:vml" xmlns:p="http://schemas.openxmlformats.org/presentationml/2006/main" mc:Ignorable="mv" mc:PreserveAttributes="mv:*" type="secHead" preserve="1">
+<p:sldLayout xmlns:a="http://schemas.openxmlformats.org/drawingml/2006/main" xmlns:r="http://schemas.openxmlformats.org/officeDocument/2006/relationships" xmlns:p="http://schemas.openxmlformats.org/presentationml/2006/main" type="secHead" preserve="1">
   <p:cSld name="Section Header">
     <p:spTree>
       <p:nvGrpSpPr>
@@ -1477,7 +1482,7 @@
             <a:fld id="{ED21B5B1-1DD9-8F46-9A43-DBE14D7AA15C}" type="datetimeFigureOut">
               <a:rPr lang="en-US" smtClean="0"/>
               <a:pPr/>
-              <a:t>3/16/15</a:t>
+              <a:t>2/2/16</a:t>
             </a:fld>
             <a:endParaRPr lang="en-US"/>
           </a:p>
@@ -1535,7 +1540,7 @@
 </file>
 
 <file path=ppt/slideLayouts/slideLayout4.xml><?xml version="1.0" encoding="utf-8"?>
-<p:sldLayout xmlns:a="http://schemas.openxmlformats.org/drawingml/2006/main" xmlns:r="http://schemas.openxmlformats.org/officeDocument/2006/relationships" xmlns:mc="http://schemas.openxmlformats.org/markup-compatibility/2006" xmlns:mv="urn:schemas-microsoft-com:mac:vml" xmlns:p="http://schemas.openxmlformats.org/presentationml/2006/main" mc:Ignorable="mv" mc:PreserveAttributes="mv:*" type="twoObj" preserve="1">
+<p:sldLayout xmlns:a="http://schemas.openxmlformats.org/drawingml/2006/main" xmlns:r="http://schemas.openxmlformats.org/officeDocument/2006/relationships" xmlns:p="http://schemas.openxmlformats.org/presentationml/2006/main" type="twoObj" preserve="1">
   <p:cSld name="Two Content">
     <p:spTree>
       <p:nvGrpSpPr>
@@ -1762,7 +1767,7 @@
             <a:fld id="{ED21B5B1-1DD9-8F46-9A43-DBE14D7AA15C}" type="datetimeFigureOut">
               <a:rPr lang="en-US" smtClean="0"/>
               <a:pPr/>
-              <a:t>3/16/15</a:t>
+              <a:t>2/2/16</a:t>
             </a:fld>
             <a:endParaRPr lang="en-US"/>
           </a:p>
@@ -1820,7 +1825,7 @@
 </file>
 
 <file path=ppt/slideLayouts/slideLayout5.xml><?xml version="1.0" encoding="utf-8"?>
-<p:sldLayout xmlns:a="http://schemas.openxmlformats.org/drawingml/2006/main" xmlns:r="http://schemas.openxmlformats.org/officeDocument/2006/relationships" xmlns:mc="http://schemas.openxmlformats.org/markup-compatibility/2006" xmlns:mv="urn:schemas-microsoft-com:mac:vml" xmlns:p="http://schemas.openxmlformats.org/presentationml/2006/main" mc:Ignorable="mv" mc:PreserveAttributes="mv:*" type="twoTxTwoObj" preserve="1">
+<p:sldLayout xmlns:a="http://schemas.openxmlformats.org/drawingml/2006/main" xmlns:r="http://schemas.openxmlformats.org/officeDocument/2006/relationships" xmlns:p="http://schemas.openxmlformats.org/presentationml/2006/main" type="twoTxTwoObj" preserve="1">
   <p:cSld name="Comparison">
     <p:spTree>
       <p:nvGrpSpPr>
@@ -2181,7 +2186,7 @@
             <a:fld id="{ED21B5B1-1DD9-8F46-9A43-DBE14D7AA15C}" type="datetimeFigureOut">
               <a:rPr lang="en-US" smtClean="0"/>
               <a:pPr/>
-              <a:t>3/16/15</a:t>
+              <a:t>2/2/16</a:t>
             </a:fld>
             <a:endParaRPr lang="en-US"/>
           </a:p>
@@ -2239,7 +2244,7 @@
 </file>
 
 <file path=ppt/slideLayouts/slideLayout6.xml><?xml version="1.0" encoding="utf-8"?>
-<p:sldLayout xmlns:a="http://schemas.openxmlformats.org/drawingml/2006/main" xmlns:r="http://schemas.openxmlformats.org/officeDocument/2006/relationships" xmlns:mc="http://schemas.openxmlformats.org/markup-compatibility/2006" xmlns:mv="urn:schemas-microsoft-com:mac:vml" xmlns:p="http://schemas.openxmlformats.org/presentationml/2006/main" mc:Ignorable="mv" mc:PreserveAttributes="mv:*" type="titleOnly" preserve="1">
+<p:sldLayout xmlns:a="http://schemas.openxmlformats.org/drawingml/2006/main" xmlns:r="http://schemas.openxmlformats.org/officeDocument/2006/relationships" xmlns:p="http://schemas.openxmlformats.org/presentationml/2006/main" type="titleOnly" preserve="1">
   <p:cSld name="Title Only">
     <p:spTree>
       <p:nvGrpSpPr>
@@ -2296,7 +2301,7 @@
             <a:fld id="{ED21B5B1-1DD9-8F46-9A43-DBE14D7AA15C}" type="datetimeFigureOut">
               <a:rPr lang="en-US" smtClean="0"/>
               <a:pPr/>
-              <a:t>3/16/15</a:t>
+              <a:t>2/2/16</a:t>
             </a:fld>
             <a:endParaRPr lang="en-US"/>
           </a:p>
@@ -2354,7 +2359,7 @@
 </file>
 
 <file path=ppt/slideLayouts/slideLayout7.xml><?xml version="1.0" encoding="utf-8"?>
-<p:sldLayout xmlns:a="http://schemas.openxmlformats.org/drawingml/2006/main" xmlns:r="http://schemas.openxmlformats.org/officeDocument/2006/relationships" xmlns:mc="http://schemas.openxmlformats.org/markup-compatibility/2006" xmlns:mv="urn:schemas-microsoft-com:mac:vml" xmlns:p="http://schemas.openxmlformats.org/presentationml/2006/main" mc:Ignorable="mv" mc:PreserveAttributes="mv:*" type="blank" preserve="1">
+<p:sldLayout xmlns:a="http://schemas.openxmlformats.org/drawingml/2006/main" xmlns:r="http://schemas.openxmlformats.org/officeDocument/2006/relationships" xmlns:p="http://schemas.openxmlformats.org/presentationml/2006/main" type="blank" preserve="1">
   <p:cSld name="Blank">
     <p:spTree>
       <p:nvGrpSpPr>
@@ -2388,7 +2393,7 @@
             <a:fld id="{ED21B5B1-1DD9-8F46-9A43-DBE14D7AA15C}" type="datetimeFigureOut">
               <a:rPr lang="en-US" smtClean="0"/>
               <a:pPr/>
-              <a:t>3/16/15</a:t>
+              <a:t>2/2/16</a:t>
             </a:fld>
             <a:endParaRPr lang="en-US"/>
           </a:p>
@@ -2446,7 +2451,7 @@
 </file>
 
 <file path=ppt/slideLayouts/slideLayout8.xml><?xml version="1.0" encoding="utf-8"?>
-<p:sldLayout xmlns:a="http://schemas.openxmlformats.org/drawingml/2006/main" xmlns:r="http://schemas.openxmlformats.org/officeDocument/2006/relationships" xmlns:mc="http://schemas.openxmlformats.org/markup-compatibility/2006" xmlns:mv="urn:schemas-microsoft-com:mac:vml" xmlns:p="http://schemas.openxmlformats.org/presentationml/2006/main" mc:Ignorable="mv" mc:PreserveAttributes="mv:*" type="objTx" preserve="1">
+<p:sldLayout xmlns:a="http://schemas.openxmlformats.org/drawingml/2006/main" xmlns:r="http://schemas.openxmlformats.org/officeDocument/2006/relationships" xmlns:p="http://schemas.openxmlformats.org/presentationml/2006/main" type="objTx" preserve="1">
   <p:cSld name="Content with Caption">
     <p:spTree>
       <p:nvGrpSpPr>
@@ -2662,7 +2667,7 @@
             <a:fld id="{ED21B5B1-1DD9-8F46-9A43-DBE14D7AA15C}" type="datetimeFigureOut">
               <a:rPr lang="en-US" smtClean="0"/>
               <a:pPr/>
-              <a:t>3/16/15</a:t>
+              <a:t>2/2/16</a:t>
             </a:fld>
             <a:endParaRPr lang="en-US"/>
           </a:p>
@@ -2720,7 +2725,7 @@
 </file>
 
 <file path=ppt/slideLayouts/slideLayout9.xml><?xml version="1.0" encoding="utf-8"?>
-<p:sldLayout xmlns:a="http://schemas.openxmlformats.org/drawingml/2006/main" xmlns:r="http://schemas.openxmlformats.org/officeDocument/2006/relationships" xmlns:mc="http://schemas.openxmlformats.org/markup-compatibility/2006" xmlns:mv="urn:schemas-microsoft-com:mac:vml" xmlns:p="http://schemas.openxmlformats.org/presentationml/2006/main" mc:Ignorable="mv" mc:PreserveAttributes="mv:*" type="picTx" preserve="1">
+<p:sldLayout xmlns:a="http://schemas.openxmlformats.org/drawingml/2006/main" xmlns:r="http://schemas.openxmlformats.org/officeDocument/2006/relationships" xmlns:p="http://schemas.openxmlformats.org/presentationml/2006/main" type="picTx" preserve="1">
   <p:cSld name="Picture with Caption">
     <p:spTree>
       <p:nvGrpSpPr>
@@ -2912,7 +2917,7 @@
             <a:fld id="{ED21B5B1-1DD9-8F46-9A43-DBE14D7AA15C}" type="datetimeFigureOut">
               <a:rPr lang="en-US" smtClean="0"/>
               <a:pPr/>
-              <a:t>3/16/15</a:t>
+              <a:t>2/2/16</a:t>
             </a:fld>
             <a:endParaRPr lang="en-US"/>
           </a:p>
@@ -2970,7 +2975,7 @@
 </file>
 
 <file path=ppt/slideMasters/slideMaster1.xml><?xml version="1.0" encoding="utf-8"?>
-<p:sldMaster xmlns:a="http://schemas.openxmlformats.org/drawingml/2006/main" xmlns:r="http://schemas.openxmlformats.org/officeDocument/2006/relationships" xmlns:mc="http://schemas.openxmlformats.org/markup-compatibility/2006" xmlns:mv="urn:schemas-microsoft-com:mac:vml" xmlns:p="http://schemas.openxmlformats.org/presentationml/2006/main" mc:Ignorable="mv" mc:PreserveAttributes="mv:*">
+<p:sldMaster xmlns:a="http://schemas.openxmlformats.org/drawingml/2006/main" xmlns:r="http://schemas.openxmlformats.org/officeDocument/2006/relationships" xmlns:p="http://schemas.openxmlformats.org/presentationml/2006/main">
   <p:cSld>
     <p:bg>
       <p:bgRef idx="1001">
@@ -3122,7 +3127,7 @@
             <a:fld id="{ED21B5B1-1DD9-8F46-9A43-DBE14D7AA15C}" type="datetimeFigureOut">
               <a:rPr lang="en-US" smtClean="0"/>
               <a:pPr/>
-              <a:t>3/16/15</a:t>
+              <a:t>2/2/16</a:t>
             </a:fld>
             <a:endParaRPr lang="en-US"/>
           </a:p>
@@ -3477,7 +3482,7 @@
 </file>
 
 <file path=ppt/slides/slide1.xml><?xml version="1.0" encoding="utf-8"?>
-<p:sld xmlns:a="http://schemas.openxmlformats.org/drawingml/2006/main" xmlns:r="http://schemas.openxmlformats.org/officeDocument/2006/relationships" xmlns:mc="http://schemas.openxmlformats.org/markup-compatibility/2006" xmlns:mv="urn:schemas-microsoft-com:mac:vml" xmlns:p="http://schemas.openxmlformats.org/presentationml/2006/main" mc:Ignorable="mv" mc:PreserveAttributes="mv:*">
+<p:sld xmlns:a="http://schemas.openxmlformats.org/drawingml/2006/main" xmlns:r="http://schemas.openxmlformats.org/officeDocument/2006/relationships" xmlns:p="http://schemas.openxmlformats.org/presentationml/2006/main">
   <p:cSld>
     <p:spTree>
       <p:nvGrpSpPr>
@@ -3563,9 +3568,7 @@
               </a:avLst>
             </a:prstGeom>
             <a:solidFill>
-              <a:schemeClr val="accent1">
-                <a:lumMod val="50000"/>
-              </a:schemeClr>
+              <a:srgbClr val="214162"/>
             </a:solidFill>
             <a:ln>
               <a:noFill/>
@@ -3604,10 +3607,7 @@
               </a:avLst>
             </a:prstGeom>
             <a:solidFill>
-              <a:schemeClr val="accent1">
-                <a:lumMod val="60000"/>
-                <a:lumOff val="40000"/>
-              </a:schemeClr>
+              <a:srgbClr val="93AFCE"/>
             </a:solidFill>
             <a:ln>
               <a:noFill/>
@@ -3685,9 +3685,7 @@
               </a:avLst>
             </a:prstGeom>
             <a:solidFill>
-              <a:schemeClr val="accent1">
-                <a:lumMod val="75000"/>
-              </a:schemeClr>
+              <a:srgbClr val="365F91"/>
             </a:solidFill>
             <a:ln>
               <a:noFill/>
@@ -3947,11 +3945,9 @@
               </a:pathLst>
             </a:custGeom>
             <a:solidFill>
-              <a:schemeClr val="accent1">
-                <a:lumMod val="40000"/>
-                <a:lumOff val="60000"/>
+              <a:srgbClr val="B6C9D7">
                 <a:alpha val="35000"/>
-              </a:schemeClr>
+              </a:srgbClr>
             </a:solidFill>
             <a:ln>
               <a:noFill/>
@@ -4005,9 +4001,7 @@
               </a:avLst>
             </a:prstGeom>
             <a:solidFill>
-              <a:schemeClr val="accent1">
-                <a:lumMod val="50000"/>
-              </a:schemeClr>
+              <a:srgbClr val="214162"/>
             </a:solidFill>
             <a:ln>
               <a:noFill/>
@@ -4046,9 +4040,7 @@
               </a:avLst>
             </a:prstGeom>
             <a:solidFill>
-              <a:schemeClr val="accent1">
-                <a:lumMod val="50000"/>
-              </a:schemeClr>
+              <a:srgbClr val="214162"/>
             </a:solidFill>
             <a:ln>
               <a:noFill/>
@@ -4087,10 +4079,7 @@
               </a:avLst>
             </a:prstGeom>
             <a:solidFill>
-              <a:schemeClr val="accent1">
-                <a:lumMod val="60000"/>
-                <a:lumOff val="40000"/>
-              </a:schemeClr>
+              <a:srgbClr val="93AFCE"/>
             </a:solidFill>
             <a:ln>
               <a:noFill/>
@@ -4129,9 +4118,7 @@
               </a:avLst>
             </a:prstGeom>
             <a:solidFill>
-              <a:schemeClr val="accent1">
-                <a:lumMod val="75000"/>
-              </a:schemeClr>
+              <a:srgbClr val="365F91"/>
             </a:solidFill>
             <a:ln>
               <a:noFill/>
@@ -4170,9 +4157,7 @@
               </a:avLst>
             </a:prstGeom>
             <a:solidFill>
-              <a:schemeClr val="accent1">
-                <a:lumMod val="50000"/>
-              </a:schemeClr>
+              <a:srgbClr val="214162"/>
             </a:solidFill>
             <a:ln>
               <a:noFill/>
@@ -4211,11 +4196,9 @@
               </a:avLst>
             </a:prstGeom>
             <a:solidFill>
-              <a:schemeClr val="accent1">
-                <a:lumMod val="60000"/>
-                <a:lumOff val="40000"/>
+              <a:srgbClr val="93AFCE">
                 <a:alpha val="68000"/>
-              </a:schemeClr>
+              </a:srgbClr>
             </a:solidFill>
             <a:ln>
               <a:noFill/>
@@ -4465,11 +4448,9 @@
               </a:pathLst>
             </a:custGeom>
             <a:solidFill>
-              <a:schemeClr val="accent1">
-                <a:lumMod val="40000"/>
-                <a:lumOff val="60000"/>
+              <a:srgbClr val="B6C9D7">
                 <a:alpha val="35000"/>
-              </a:schemeClr>
+              </a:srgbClr>
             </a:solidFill>
             <a:ln>
               <a:noFill/>
@@ -4508,10 +4489,9 @@
               </a:avLst>
             </a:prstGeom>
             <a:solidFill>
-              <a:schemeClr val="accent1">
-                <a:lumMod val="75000"/>
+              <a:srgbClr val="365F91">
                 <a:alpha val="10000"/>
-              </a:schemeClr>
+              </a:srgbClr>
             </a:solidFill>
             <a:ln>
               <a:noFill/>
@@ -4565,9 +4545,7 @@
               </a:avLst>
             </a:prstGeom>
             <a:solidFill>
-              <a:schemeClr val="accent1">
-                <a:lumMod val="50000"/>
-              </a:schemeClr>
+              <a:srgbClr val="214162"/>
             </a:solidFill>
             <a:ln>
               <a:noFill/>
@@ -4606,10 +4584,7 @@
               </a:avLst>
             </a:prstGeom>
             <a:solidFill>
-              <a:schemeClr val="accent1">
-                <a:lumMod val="60000"/>
-                <a:lumOff val="40000"/>
-              </a:schemeClr>
+              <a:srgbClr val="93AFCE"/>
             </a:solidFill>
             <a:ln>
               <a:noFill/>
@@ -4902,11 +4877,9 @@
               </a:pathLst>
             </a:custGeom>
             <a:solidFill>
-              <a:schemeClr val="accent1">
-                <a:lumMod val="40000"/>
-                <a:lumOff val="60000"/>
+              <a:srgbClr val="B6C9D7">
                 <a:alpha val="35000"/>
-              </a:schemeClr>
+              </a:srgbClr>
             </a:solidFill>
             <a:ln>
               <a:noFill/>
@@ -4960,9 +4933,7 @@
               </a:avLst>
             </a:prstGeom>
             <a:solidFill>
-              <a:schemeClr val="accent1">
-                <a:lumMod val="50000"/>
-              </a:schemeClr>
+              <a:srgbClr val="214162"/>
             </a:solidFill>
             <a:ln>
               <a:noFill/>
@@ -5001,10 +4972,7 @@
               </a:avLst>
             </a:prstGeom>
             <a:solidFill>
-              <a:schemeClr val="accent1">
-                <a:lumMod val="60000"/>
-                <a:lumOff val="40000"/>
-              </a:schemeClr>
+              <a:srgbClr val="93AFCE"/>
             </a:solidFill>
             <a:ln>
               <a:noFill/>
@@ -5281,11 +5249,9 @@
               </a:pathLst>
             </a:custGeom>
             <a:solidFill>
-              <a:schemeClr val="accent1">
-                <a:lumMod val="40000"/>
-                <a:lumOff val="60000"/>
+              <a:srgbClr val="B6C9D7">
                 <a:alpha val="35000"/>
-              </a:schemeClr>
+              </a:srgbClr>
             </a:solidFill>
             <a:ln>
               <a:noFill/>
@@ -5339,9 +5305,7 @@
               </a:avLst>
             </a:prstGeom>
             <a:solidFill>
-              <a:schemeClr val="accent1">
-                <a:lumMod val="50000"/>
-              </a:schemeClr>
+              <a:srgbClr val="214162"/>
             </a:solidFill>
             <a:ln>
               <a:noFill/>
@@ -5380,10 +5344,7 @@
               </a:avLst>
             </a:prstGeom>
             <a:solidFill>
-              <a:schemeClr val="accent1">
-                <a:lumMod val="60000"/>
-                <a:lumOff val="40000"/>
-              </a:schemeClr>
+              <a:srgbClr val="93AFCE"/>
             </a:solidFill>
             <a:ln>
               <a:noFill/>
@@ -5422,9 +5383,7 @@
               </a:avLst>
             </a:prstGeom>
             <a:solidFill>
-              <a:schemeClr val="accent1">
-                <a:lumMod val="50000"/>
-              </a:schemeClr>
+              <a:srgbClr val="214162"/>
             </a:solidFill>
             <a:ln>
               <a:noFill/>
@@ -5463,9 +5422,7 @@
               </a:avLst>
             </a:prstGeom>
             <a:solidFill>
-              <a:schemeClr val="accent1">
-                <a:lumMod val="50000"/>
-              </a:schemeClr>
+              <a:srgbClr val="214162"/>
             </a:solidFill>
             <a:ln>
               <a:noFill/>
@@ -5504,9 +5461,7 @@
               </a:avLst>
             </a:prstGeom>
             <a:solidFill>
-              <a:schemeClr val="accent1">
-                <a:lumMod val="50000"/>
-              </a:schemeClr>
+              <a:srgbClr val="214162"/>
             </a:solidFill>
             <a:ln>
               <a:noFill/>
@@ -5545,9 +5500,7 @@
               </a:avLst>
             </a:prstGeom>
             <a:solidFill>
-              <a:schemeClr val="accent1">
-                <a:lumMod val="50000"/>
-              </a:schemeClr>
+              <a:srgbClr val="214162"/>
             </a:solidFill>
             <a:ln>
               <a:noFill/>
@@ -5586,9 +5539,7 @@
               </a:avLst>
             </a:prstGeom>
             <a:solidFill>
-              <a:schemeClr val="accent1">
-                <a:lumMod val="50000"/>
-              </a:schemeClr>
+              <a:srgbClr val="214162"/>
             </a:solidFill>
             <a:ln>
               <a:noFill/>
@@ -5627,9 +5578,7 @@
               </a:avLst>
             </a:prstGeom>
             <a:solidFill>
-              <a:schemeClr val="accent1">
-                <a:lumMod val="50000"/>
-              </a:schemeClr>
+              <a:srgbClr val="214162"/>
             </a:solidFill>
             <a:ln>
               <a:noFill/>
@@ -5668,9 +5617,7 @@
               </a:avLst>
             </a:prstGeom>
             <a:solidFill>
-              <a:schemeClr val="accent1">
-                <a:lumMod val="50000"/>
-              </a:schemeClr>
+              <a:srgbClr val="214162"/>
             </a:solidFill>
             <a:ln>
               <a:noFill/>
@@ -5724,16 +5671,11 @@
               </a:avLst>
             </a:prstGeom>
             <a:solidFill>
-              <a:schemeClr val="accent1">
-                <a:lumMod val="60000"/>
-                <a:lumOff val="40000"/>
-              </a:schemeClr>
+              <a:srgbClr val="93AFCE"/>
             </a:solidFill>
             <a:ln w="38100">
               <a:solidFill>
-                <a:schemeClr val="accent1">
-                  <a:lumMod val="75000"/>
-                </a:schemeClr>
+                <a:srgbClr val="365F91"/>
               </a:solidFill>
             </a:ln>
             <a:effectLst/>
@@ -5776,16 +5718,11 @@
               <a:avLst/>
             </a:prstGeom>
             <a:solidFill>
-              <a:schemeClr val="accent1">
-                <a:lumMod val="40000"/>
-                <a:lumOff val="60000"/>
-              </a:schemeClr>
+              <a:srgbClr val="B6C9D7"/>
             </a:solidFill>
             <a:ln w="38100">
               <a:solidFill>
-                <a:schemeClr val="accent1">
-                  <a:lumMod val="75000"/>
-                </a:schemeClr>
+                <a:srgbClr val="365F91"/>
               </a:solidFill>
             </a:ln>
             <a:effectLst/>
@@ -5828,11 +5765,9 @@
               <a:avLst/>
             </a:prstGeom>
             <a:solidFill>
-              <a:schemeClr val="accent1">
-                <a:lumMod val="20000"/>
-                <a:lumOff val="80000"/>
+              <a:srgbClr val="D6E0E6">
                 <a:alpha val="52000"/>
-              </a:schemeClr>
+              </a:srgbClr>
             </a:solidFill>
             <a:ln>
               <a:noFill/>
@@ -5877,11 +5812,9 @@
               <a:avLst/>
             </a:prstGeom>
             <a:solidFill>
-              <a:schemeClr val="accent1">
-                <a:lumMod val="20000"/>
-                <a:lumOff val="80000"/>
+              <a:srgbClr val="D6E0E6">
                 <a:alpha val="77000"/>
-              </a:schemeClr>
+              </a:srgbClr>
             </a:solidFill>
             <a:ln>
               <a:noFill/>
@@ -5920,7 +5853,7 @@
   <p:timing>
     <p:tnLst>
       <p:par>
-        <p:cTn id="1" dur="indefinite" restart="never" nodeType="tmRoot"/>
+        <p:cTn xmlns:p14="http://schemas.microsoft.com/office/powerpoint/2010/main" id="1" dur="indefinite" restart="never" nodeType="tmRoot"/>
       </p:par>
     </p:tnLst>
   </p:timing>

</xml_diff>